<commit_message>
1) Change sharks' speed depending on level 2) Modify main menu, putting title "Flappy fish" 3) Change the number of sharks showing at viewport to 7 4) Game Over when fish dropped below the bottom of the view port
</commit_message>
<xml_diff>
--- a/FlappyFish/image.pptx
+++ b/FlappyFish/image.pptx
@@ -18,11 +18,12 @@
     <p:sldId id="259" r:id="rId12"/>
     <p:sldId id="271" r:id="rId13"/>
     <p:sldId id="268" r:id="rId14"/>
-    <p:sldId id="269" r:id="rId15"/>
-    <p:sldId id="267" r:id="rId16"/>
-    <p:sldId id="270" r:id="rId17"/>
-    <p:sldId id="272" r:id="rId18"/>
-    <p:sldId id="273" r:id="rId19"/>
+    <p:sldId id="275" r:id="rId15"/>
+    <p:sldId id="269" r:id="rId16"/>
+    <p:sldId id="267" r:id="rId17"/>
+    <p:sldId id="270" r:id="rId18"/>
+    <p:sldId id="272" r:id="rId19"/>
+    <p:sldId id="273" r:id="rId20"/>
   </p:sldIdLst>
   <p:sldSz cx="12192000" cy="6858000"/>
   <p:notesSz cx="6858000" cy="9144000"/>
@@ -260,7 +261,7 @@
           <a:p>
             <a:fld id="{9CDEF8F9-7F91-4CA6-AEBA-A09B6AB566B9}" type="datetimeFigureOut">
               <a:rPr lang="en-US" smtClean="0"/>
-              <a:t>1/6/2018</a:t>
+              <a:t>1/8/2018</a:t>
             </a:fld>
             <a:endParaRPr lang="en-US" dirty="0"/>
           </a:p>
@@ -430,7 +431,7 @@
           <a:p>
             <a:fld id="{9CDEF8F9-7F91-4CA6-AEBA-A09B6AB566B9}" type="datetimeFigureOut">
               <a:rPr lang="en-US" smtClean="0"/>
-              <a:t>1/6/2018</a:t>
+              <a:t>1/8/2018</a:t>
             </a:fld>
             <a:endParaRPr lang="en-US" dirty="0"/>
           </a:p>
@@ -610,7 +611,7 @@
           <a:p>
             <a:fld id="{9CDEF8F9-7F91-4CA6-AEBA-A09B6AB566B9}" type="datetimeFigureOut">
               <a:rPr lang="en-US" smtClean="0"/>
-              <a:t>1/6/2018</a:t>
+              <a:t>1/8/2018</a:t>
             </a:fld>
             <a:endParaRPr lang="en-US" dirty="0"/>
           </a:p>
@@ -780,7 +781,7 @@
           <a:p>
             <a:fld id="{9CDEF8F9-7F91-4CA6-AEBA-A09B6AB566B9}" type="datetimeFigureOut">
               <a:rPr lang="en-US" smtClean="0"/>
-              <a:t>1/6/2018</a:t>
+              <a:t>1/8/2018</a:t>
             </a:fld>
             <a:endParaRPr lang="en-US" dirty="0"/>
           </a:p>
@@ -1026,7 +1027,7 @@
           <a:p>
             <a:fld id="{9CDEF8F9-7F91-4CA6-AEBA-A09B6AB566B9}" type="datetimeFigureOut">
               <a:rPr lang="en-US" smtClean="0"/>
-              <a:t>1/6/2018</a:t>
+              <a:t>1/8/2018</a:t>
             </a:fld>
             <a:endParaRPr lang="en-US" dirty="0"/>
           </a:p>
@@ -1258,7 +1259,7 @@
           <a:p>
             <a:fld id="{9CDEF8F9-7F91-4CA6-AEBA-A09B6AB566B9}" type="datetimeFigureOut">
               <a:rPr lang="en-US" smtClean="0"/>
-              <a:t>1/6/2018</a:t>
+              <a:t>1/8/2018</a:t>
             </a:fld>
             <a:endParaRPr lang="en-US" dirty="0"/>
           </a:p>
@@ -1625,7 +1626,7 @@
           <a:p>
             <a:fld id="{9CDEF8F9-7F91-4CA6-AEBA-A09B6AB566B9}" type="datetimeFigureOut">
               <a:rPr lang="en-US" smtClean="0"/>
-              <a:t>1/6/2018</a:t>
+              <a:t>1/8/2018</a:t>
             </a:fld>
             <a:endParaRPr lang="en-US" dirty="0"/>
           </a:p>
@@ -1743,7 +1744,7 @@
           <a:p>
             <a:fld id="{9CDEF8F9-7F91-4CA6-AEBA-A09B6AB566B9}" type="datetimeFigureOut">
               <a:rPr lang="en-US" smtClean="0"/>
-              <a:t>1/6/2018</a:t>
+              <a:t>1/8/2018</a:t>
             </a:fld>
             <a:endParaRPr lang="en-US" dirty="0"/>
           </a:p>
@@ -1838,7 +1839,7 @@
           <a:p>
             <a:fld id="{9CDEF8F9-7F91-4CA6-AEBA-A09B6AB566B9}" type="datetimeFigureOut">
               <a:rPr lang="en-US" smtClean="0"/>
-              <a:t>1/6/2018</a:t>
+              <a:t>1/8/2018</a:t>
             </a:fld>
             <a:endParaRPr lang="en-US" dirty="0"/>
           </a:p>
@@ -2115,7 +2116,7 @@
           <a:p>
             <a:fld id="{9CDEF8F9-7F91-4CA6-AEBA-A09B6AB566B9}" type="datetimeFigureOut">
               <a:rPr lang="en-US" smtClean="0"/>
-              <a:t>1/6/2018</a:t>
+              <a:t>1/8/2018</a:t>
             </a:fld>
             <a:endParaRPr lang="en-US" dirty="0"/>
           </a:p>
@@ -2368,7 +2369,7 @@
           <a:p>
             <a:fld id="{9CDEF8F9-7F91-4CA6-AEBA-A09B6AB566B9}" type="datetimeFigureOut">
               <a:rPr lang="en-US" smtClean="0"/>
-              <a:t>1/6/2018</a:t>
+              <a:t>1/8/2018</a:t>
             </a:fld>
             <a:endParaRPr lang="en-US" dirty="0"/>
           </a:p>
@@ -2581,7 +2582,7 @@
           <a:p>
             <a:fld id="{9CDEF8F9-7F91-4CA6-AEBA-A09B6AB566B9}" type="datetimeFigureOut">
               <a:rPr lang="en-US" smtClean="0"/>
-              <a:t>1/6/2018</a:t>
+              <a:t>1/8/2018</a:t>
             </a:fld>
             <a:endParaRPr lang="en-US" dirty="0"/>
           </a:p>
@@ -7461,6 +7462,91 @@
           </a:extLst>
         </p:spPr>
       </p:pic>
+      <p:sp>
+        <p:nvSpPr>
+          <p:cNvPr id="3" name="직사각형 2"/>
+          <p:cNvSpPr/>
+          <p:nvPr/>
+        </p:nvSpPr>
+        <p:spPr>
+          <a:xfrm>
+            <a:off x="2573057" y="1586606"/>
+            <a:ext cx="4517006" cy="1107996"/>
+          </a:xfrm>
+          <a:prstGeom prst="rect">
+            <a:avLst/>
+          </a:prstGeom>
+          <a:noFill/>
+        </p:spPr>
+        <p:txBody>
+          <a:bodyPr wrap="none" lIns="91440" tIns="45720" rIns="91440" bIns="45720">
+            <a:spAutoFit/>
+          </a:bodyPr>
+          <a:lstStyle/>
+          <a:p>
+            <a:pPr algn="ctr"/>
+            <a:r>
+              <a:rPr lang="en-US" altLang="ko-KR" sz="6600" b="1" cap="none" spc="0" dirty="0" smtClean="0">
+                <a:ln w="12700">
+                  <a:solidFill>
+                    <a:schemeClr val="tx2">
+                      <a:lumMod val="75000"/>
+                    </a:schemeClr>
+                  </a:solidFill>
+                  <a:prstDash val="solid"/>
+                </a:ln>
+                <a:pattFill prst="dkUpDiag">
+                  <a:fgClr>
+                    <a:schemeClr val="tx2"/>
+                  </a:fgClr>
+                  <a:bgClr>
+                    <a:schemeClr val="tx2">
+                      <a:lumMod val="20000"/>
+                      <a:lumOff val="80000"/>
+                    </a:schemeClr>
+                  </a:bgClr>
+                </a:pattFill>
+                <a:effectLst>
+                  <a:outerShdw dist="38100" dir="2640000" algn="bl" rotWithShape="0">
+                    <a:schemeClr val="tx2">
+                      <a:lumMod val="75000"/>
+                    </a:schemeClr>
+                  </a:outerShdw>
+                </a:effectLst>
+              </a:rPr>
+              <a:t>FLAPPY FISH</a:t>
+            </a:r>
+            <a:endParaRPr lang="en-US" altLang="ko-KR" sz="6600" b="1" cap="none" spc="0" dirty="0">
+              <a:ln w="12700">
+                <a:solidFill>
+                  <a:schemeClr val="tx2">
+                    <a:lumMod val="75000"/>
+                  </a:schemeClr>
+                </a:solidFill>
+                <a:prstDash val="solid"/>
+              </a:ln>
+              <a:pattFill prst="dkUpDiag">
+                <a:fgClr>
+                  <a:schemeClr val="tx2"/>
+                </a:fgClr>
+                <a:bgClr>
+                  <a:schemeClr val="tx2">
+                    <a:lumMod val="20000"/>
+                    <a:lumOff val="80000"/>
+                  </a:schemeClr>
+                </a:bgClr>
+              </a:pattFill>
+              <a:effectLst>
+                <a:outerShdw dist="38100" dir="2640000" algn="bl" rotWithShape="0">
+                  <a:schemeClr val="tx2">
+                    <a:lumMod val="75000"/>
+                  </a:schemeClr>
+                </a:outerShdw>
+              </a:effectLst>
+            </a:endParaRPr>
+          </a:p>
+        </p:txBody>
+      </p:sp>
     </p:spTree>
     <p:extLst>
       <p:ext uri="{BB962C8B-B14F-4D97-AF65-F5344CB8AC3E}">
@@ -7498,357 +7584,945 @@
           <a:chExt cx="0" cy="0"/>
         </a:xfrm>
       </p:grpSpPr>
-      <p:sp>
-        <p:nvSpPr>
-          <p:cNvPr id="2" name="Rectangle 1"/>
-          <p:cNvSpPr/>
+      <p:grpSp>
+        <p:nvGrpSpPr>
+          <p:cNvPr id="9" name="그룹 8"/>
+          <p:cNvGrpSpPr/>
           <p:nvPr/>
-        </p:nvSpPr>
-        <p:spPr>
+        </p:nvGrpSpPr>
+        <p:grpSpPr>
           <a:xfrm>
             <a:off x="1953490" y="964277"/>
             <a:ext cx="7739149" cy="5153890"/>
+            <a:chOff x="1953490" y="964277"/>
+            <a:chExt cx="7739149" cy="5153890"/>
           </a:xfrm>
-          <a:prstGeom prst="rect">
-            <a:avLst/>
-          </a:prstGeom>
-          <a:gradFill flip="none" rotWithShape="1">
-            <a:gsLst>
-              <a:gs pos="0">
-                <a:schemeClr val="accent1">
-                  <a:lumMod val="67000"/>
-                </a:schemeClr>
-              </a:gs>
-              <a:gs pos="48000">
-                <a:schemeClr val="accent1">
-                  <a:lumMod val="97000"/>
-                  <a:lumOff val="3000"/>
-                </a:schemeClr>
-              </a:gs>
-              <a:gs pos="100000">
-                <a:schemeClr val="accent1">
-                  <a:lumMod val="60000"/>
-                  <a:lumOff val="40000"/>
-                </a:schemeClr>
-              </a:gs>
-            </a:gsLst>
-            <a:lin ang="16200000" scaled="1"/>
-            <a:tileRect/>
-          </a:gradFill>
-          <a:ln>
+        </p:grpSpPr>
+        <p:sp>
+          <p:nvSpPr>
+            <p:cNvPr id="2" name="Rectangle 1"/>
+            <p:cNvSpPr/>
+            <p:nvPr/>
+          </p:nvSpPr>
+          <p:spPr>
+            <a:xfrm>
+              <a:off x="1953490" y="964277"/>
+              <a:ext cx="7739149" cy="5153890"/>
+            </a:xfrm>
+            <a:prstGeom prst="rect">
+              <a:avLst/>
+            </a:prstGeom>
+            <a:gradFill flip="none" rotWithShape="1">
+              <a:gsLst>
+                <a:gs pos="0">
+                  <a:schemeClr val="accent1">
+                    <a:lumMod val="67000"/>
+                  </a:schemeClr>
+                </a:gs>
+                <a:gs pos="48000">
+                  <a:schemeClr val="accent1">
+                    <a:lumMod val="97000"/>
+                    <a:lumOff val="3000"/>
+                  </a:schemeClr>
+                </a:gs>
+                <a:gs pos="100000">
+                  <a:schemeClr val="accent1">
+                    <a:lumMod val="60000"/>
+                    <a:lumOff val="40000"/>
+                  </a:schemeClr>
+                </a:gs>
+              </a:gsLst>
+              <a:lin ang="16200000" scaled="1"/>
+              <a:tileRect/>
+            </a:gradFill>
+            <a:ln>
+              <a:noFill/>
+            </a:ln>
+          </p:spPr>
+          <p:style>
+            <a:lnRef idx="0">
+              <a:scrgbClr r="0" g="0" b="0"/>
+            </a:lnRef>
+            <a:fillRef idx="0">
+              <a:scrgbClr r="0" g="0" b="0"/>
+            </a:fillRef>
+            <a:effectRef idx="0">
+              <a:scrgbClr r="0" g="0" b="0"/>
+            </a:effectRef>
+            <a:fontRef idx="minor">
+              <a:schemeClr val="lt1"/>
+            </a:fontRef>
+          </p:style>
+          <p:txBody>
+            <a:bodyPr rtlCol="0" anchor="ctr"/>
+            <a:lstStyle/>
+            <a:p>
+              <a:pPr algn="ctr"/>
+              <a:endParaRPr lang="en-US"/>
+            </a:p>
+          </p:txBody>
+        </p:sp>
+        <p:pic>
+          <p:nvPicPr>
+            <p:cNvPr id="4" name="Picture 2" descr="Image result for seamless sand"/>
+            <p:cNvPicPr>
+              <a:picLocks noChangeAspect="1" noChangeArrowheads="1"/>
+            </p:cNvPicPr>
+            <p:nvPr/>
+          </p:nvPicPr>
+          <p:blipFill>
+            <a:blip r:embed="rId2">
+              <a:extLst>
+                <a:ext uri="{28A0092B-C50C-407E-A947-70E740481C1C}">
+                  <a14:useLocalDpi xmlns:a14="http://schemas.microsoft.com/office/drawing/2010/main" val="0"/>
+                </a:ext>
+              </a:extLst>
+            </a:blip>
+            <a:srcRect/>
+            <a:stretch>
+              <a:fillRect/>
+            </a:stretch>
+          </p:blipFill>
+          <p:spPr bwMode="auto">
+            <a:xfrm>
+              <a:off x="1953490" y="5252343"/>
+              <a:ext cx="4514850" cy="865824"/>
+            </a:xfrm>
+            <a:prstGeom prst="rect">
+              <a:avLst/>
+            </a:prstGeom>
             <a:noFill/>
-          </a:ln>
-        </p:spPr>
-        <p:style>
-          <a:lnRef idx="0">
-            <a:scrgbClr r="0" g="0" b="0"/>
-          </a:lnRef>
-          <a:fillRef idx="0">
-            <a:scrgbClr r="0" g="0" b="0"/>
-          </a:fillRef>
-          <a:effectRef idx="0">
-            <a:scrgbClr r="0" g="0" b="0"/>
-          </a:effectRef>
-          <a:fontRef idx="minor">
-            <a:schemeClr val="lt1"/>
-          </a:fontRef>
-        </p:style>
-        <p:txBody>
-          <a:bodyPr rtlCol="0" anchor="ctr"/>
-          <a:lstStyle/>
-          <a:p>
-            <a:pPr algn="ctr"/>
-            <a:endParaRPr lang="en-US"/>
-          </a:p>
-        </p:txBody>
-      </p:sp>
-      <p:pic>
-        <p:nvPicPr>
-          <p:cNvPr id="4" name="Picture 2" descr="Image result for seamless sand"/>
-          <p:cNvPicPr>
-            <a:picLocks noChangeAspect="1" noChangeArrowheads="1"/>
-          </p:cNvPicPr>
-          <p:nvPr/>
-        </p:nvPicPr>
-        <p:blipFill>
-          <a:blip r:embed="rId2">
             <a:extLst>
-              <a:ext uri="{28A0092B-C50C-407E-A947-70E740481C1C}">
-                <a14:useLocalDpi xmlns:a14="http://schemas.microsoft.com/office/drawing/2010/main" val="0"/>
+              <a:ext uri="{909E8E84-426E-40DD-AFC4-6F175D3DCCD1}">
+                <a14:hiddenFill xmlns:a14="http://schemas.microsoft.com/office/drawing/2010/main">
+                  <a:solidFill>
+                    <a:srgbClr val="FFFFFF"/>
+                  </a:solidFill>
+                </a14:hiddenFill>
               </a:ext>
             </a:extLst>
-          </a:blip>
-          <a:srcRect/>
-          <a:stretch>
-            <a:fillRect/>
-          </a:stretch>
-        </p:blipFill>
-        <p:spPr bwMode="auto">
-          <a:xfrm>
-            <a:off x="1953490" y="5252343"/>
-            <a:ext cx="4514850" cy="865824"/>
-          </a:xfrm>
-          <a:prstGeom prst="rect">
-            <a:avLst/>
-          </a:prstGeom>
-          <a:noFill/>
-          <a:extLst>
-            <a:ext uri="{909E8E84-426E-40DD-AFC4-6F175D3DCCD1}">
-              <a14:hiddenFill xmlns:a14="http://schemas.microsoft.com/office/drawing/2010/main">
-                <a:solidFill>
-                  <a:srgbClr val="FFFFFF"/>
-                </a:solidFill>
-              </a14:hiddenFill>
-            </a:ext>
-          </a:extLst>
-        </p:spPr>
-      </p:pic>
-      <p:pic>
-        <p:nvPicPr>
-          <p:cNvPr id="5" name="Picture 2" descr="Image result for seamless sand"/>
-          <p:cNvPicPr>
-            <a:picLocks noChangeAspect="1" noChangeArrowheads="1"/>
-          </p:cNvPicPr>
-          <p:nvPr/>
-        </p:nvPicPr>
-        <p:blipFill>
-          <a:blip r:embed="rId2">
+          </p:spPr>
+        </p:pic>
+        <p:pic>
+          <p:nvPicPr>
+            <p:cNvPr id="5" name="Picture 2" descr="Image result for seamless sand"/>
+            <p:cNvPicPr>
+              <a:picLocks noChangeAspect="1" noChangeArrowheads="1"/>
+            </p:cNvPicPr>
+            <p:nvPr/>
+          </p:nvPicPr>
+          <p:blipFill>
+            <a:blip r:embed="rId2">
+              <a:extLst>
+                <a:ext uri="{28A0092B-C50C-407E-A947-70E740481C1C}">
+                  <a14:useLocalDpi xmlns:a14="http://schemas.microsoft.com/office/drawing/2010/main" val="0"/>
+                </a:ext>
+              </a:extLst>
+            </a:blip>
+            <a:srcRect/>
+            <a:stretch>
+              <a:fillRect/>
+            </a:stretch>
+          </p:blipFill>
+          <p:spPr bwMode="auto">
+            <a:xfrm>
+              <a:off x="6468339" y="5252343"/>
+              <a:ext cx="3224299" cy="865824"/>
+            </a:xfrm>
+            <a:prstGeom prst="rect">
+              <a:avLst/>
+            </a:prstGeom>
+            <a:noFill/>
             <a:extLst>
-              <a:ext uri="{28A0092B-C50C-407E-A947-70E740481C1C}">
-                <a14:useLocalDpi xmlns:a14="http://schemas.microsoft.com/office/drawing/2010/main" val="0"/>
+              <a:ext uri="{909E8E84-426E-40DD-AFC4-6F175D3DCCD1}">
+                <a14:hiddenFill xmlns:a14="http://schemas.microsoft.com/office/drawing/2010/main">
+                  <a:solidFill>
+                    <a:srgbClr val="FFFFFF"/>
+                  </a:solidFill>
+                </a14:hiddenFill>
               </a:ext>
             </a:extLst>
-          </a:blip>
-          <a:srcRect/>
-          <a:stretch>
-            <a:fillRect/>
-          </a:stretch>
-        </p:blipFill>
-        <p:spPr bwMode="auto">
-          <a:xfrm>
-            <a:off x="6468339" y="5252343"/>
-            <a:ext cx="3224299" cy="865824"/>
-          </a:xfrm>
-          <a:prstGeom prst="rect">
-            <a:avLst/>
-          </a:prstGeom>
-          <a:noFill/>
-          <a:extLst>
-            <a:ext uri="{909E8E84-426E-40DD-AFC4-6F175D3DCCD1}">
-              <a14:hiddenFill xmlns:a14="http://schemas.microsoft.com/office/drawing/2010/main">
-                <a:solidFill>
-                  <a:srgbClr val="FFFFFF"/>
-                </a:solidFill>
-              </a14:hiddenFill>
-            </a:ext>
-          </a:extLst>
-        </p:spPr>
-      </p:pic>
-      <p:pic>
-        <p:nvPicPr>
-          <p:cNvPr id="6" name="Picture 18" descr="Image result for seaweed png"/>
-          <p:cNvPicPr>
-            <a:picLocks noChangeAspect="1" noChangeArrowheads="1"/>
-          </p:cNvPicPr>
-          <p:nvPr/>
-        </p:nvPicPr>
-        <p:blipFill>
-          <a:blip r:embed="rId3" cstate="print">
+          </p:spPr>
+        </p:pic>
+        <p:pic>
+          <p:nvPicPr>
+            <p:cNvPr id="6" name="Picture 18" descr="Image result for seaweed png"/>
+            <p:cNvPicPr>
+              <a:picLocks noChangeAspect="1" noChangeArrowheads="1"/>
+            </p:cNvPicPr>
+            <p:nvPr/>
+          </p:nvPicPr>
+          <p:blipFill>
+            <a:blip r:embed="rId3" cstate="print">
+              <a:extLst>
+                <a:ext uri="{28A0092B-C50C-407E-A947-70E740481C1C}">
+                  <a14:useLocalDpi xmlns:a14="http://schemas.microsoft.com/office/drawing/2010/main" val="0"/>
+                </a:ext>
+              </a:extLst>
+            </a:blip>
+            <a:srcRect/>
+            <a:stretch>
+              <a:fillRect/>
+            </a:stretch>
+          </p:blipFill>
+          <p:spPr bwMode="auto">
+            <a:xfrm>
+              <a:off x="7681348" y="4382027"/>
+              <a:ext cx="1507115" cy="1507115"/>
+            </a:xfrm>
+            <a:prstGeom prst="rect">
+              <a:avLst/>
+            </a:prstGeom>
+            <a:noFill/>
             <a:extLst>
-              <a:ext uri="{28A0092B-C50C-407E-A947-70E740481C1C}">
-                <a14:useLocalDpi xmlns:a14="http://schemas.microsoft.com/office/drawing/2010/main" val="0"/>
+              <a:ext uri="{909E8E84-426E-40DD-AFC4-6F175D3DCCD1}">
+                <a14:hiddenFill xmlns:a14="http://schemas.microsoft.com/office/drawing/2010/main">
+                  <a:solidFill>
+                    <a:srgbClr val="FFFFFF"/>
+                  </a:solidFill>
+                </a14:hiddenFill>
               </a:ext>
             </a:extLst>
-          </a:blip>
-          <a:srcRect/>
-          <a:stretch>
-            <a:fillRect/>
-          </a:stretch>
-        </p:blipFill>
-        <p:spPr bwMode="auto">
-          <a:xfrm>
-            <a:off x="7681348" y="4382027"/>
-            <a:ext cx="1507115" cy="1507115"/>
-          </a:xfrm>
-          <a:prstGeom prst="rect">
-            <a:avLst/>
-          </a:prstGeom>
-          <a:noFill/>
-          <a:extLst>
-            <a:ext uri="{909E8E84-426E-40DD-AFC4-6F175D3DCCD1}">
-              <a14:hiddenFill xmlns:a14="http://schemas.microsoft.com/office/drawing/2010/main">
-                <a:solidFill>
-                  <a:srgbClr val="FFFFFF"/>
-                </a:solidFill>
-              </a14:hiddenFill>
-            </a:ext>
-          </a:extLst>
-        </p:spPr>
-      </p:pic>
-      <p:pic>
-        <p:nvPicPr>
-          <p:cNvPr id="7" name="Picture 30" descr="Image result for seaweed png"/>
-          <p:cNvPicPr>
-            <a:picLocks noChangeAspect="1" noChangeArrowheads="1"/>
-          </p:cNvPicPr>
-          <p:nvPr/>
-        </p:nvPicPr>
-        <p:blipFill>
-          <a:blip r:embed="rId4">
+          </p:spPr>
+        </p:pic>
+        <p:pic>
+          <p:nvPicPr>
+            <p:cNvPr id="7" name="Picture 30" descr="Image result for seaweed png"/>
+            <p:cNvPicPr>
+              <a:picLocks noChangeAspect="1" noChangeArrowheads="1"/>
+            </p:cNvPicPr>
+            <p:nvPr/>
+          </p:nvPicPr>
+          <p:blipFill>
+            <a:blip r:embed="rId4">
+              <a:extLst>
+                <a:ext uri="{28A0092B-C50C-407E-A947-70E740481C1C}">
+                  <a14:useLocalDpi xmlns:a14="http://schemas.microsoft.com/office/drawing/2010/main" val="0"/>
+                </a:ext>
+              </a:extLst>
+            </a:blip>
+            <a:srcRect/>
+            <a:stretch>
+              <a:fillRect/>
+            </a:stretch>
+          </p:blipFill>
+          <p:spPr bwMode="auto">
+            <a:xfrm>
+              <a:off x="6595827" y="3747786"/>
+              <a:ext cx="1162690" cy="1781409"/>
+            </a:xfrm>
+            <a:prstGeom prst="rect">
+              <a:avLst/>
+            </a:prstGeom>
+            <a:noFill/>
             <a:extLst>
-              <a:ext uri="{28A0092B-C50C-407E-A947-70E740481C1C}">
-                <a14:useLocalDpi xmlns:a14="http://schemas.microsoft.com/office/drawing/2010/main" val="0"/>
+              <a:ext uri="{909E8E84-426E-40DD-AFC4-6F175D3DCCD1}">
+                <a14:hiddenFill xmlns:a14="http://schemas.microsoft.com/office/drawing/2010/main">
+                  <a:solidFill>
+                    <a:srgbClr val="FFFFFF"/>
+                  </a:solidFill>
+                </a14:hiddenFill>
               </a:ext>
             </a:extLst>
-          </a:blip>
-          <a:srcRect/>
-          <a:stretch>
-            <a:fillRect/>
-          </a:stretch>
-        </p:blipFill>
-        <p:spPr bwMode="auto">
-          <a:xfrm>
-            <a:off x="6595827" y="3747786"/>
-            <a:ext cx="1162690" cy="1781409"/>
-          </a:xfrm>
-          <a:prstGeom prst="rect">
-            <a:avLst/>
-          </a:prstGeom>
-          <a:noFill/>
-          <a:extLst>
-            <a:ext uri="{909E8E84-426E-40DD-AFC4-6F175D3DCCD1}">
-              <a14:hiddenFill xmlns:a14="http://schemas.microsoft.com/office/drawing/2010/main">
-                <a:solidFill>
-                  <a:srgbClr val="FFFFFF"/>
-                </a:solidFill>
-              </a14:hiddenFill>
-            </a:ext>
-          </a:extLst>
-        </p:spPr>
-      </p:pic>
-      <p:pic>
-        <p:nvPicPr>
-          <p:cNvPr id="8" name="Picture 34" descr="Image result for seaweed png"/>
-          <p:cNvPicPr>
-            <a:picLocks noChangeAspect="1" noChangeArrowheads="1"/>
-          </p:cNvPicPr>
-          <p:nvPr/>
-        </p:nvPicPr>
-        <p:blipFill>
-          <a:blip r:embed="rId5">
+          </p:spPr>
+        </p:pic>
+        <p:pic>
+          <p:nvPicPr>
+            <p:cNvPr id="8" name="Picture 34" descr="Image result for seaweed png"/>
+            <p:cNvPicPr>
+              <a:picLocks noChangeAspect="1" noChangeArrowheads="1"/>
+            </p:cNvPicPr>
+            <p:nvPr/>
+          </p:nvPicPr>
+          <p:blipFill>
+            <a:blip r:embed="rId5">
+              <a:extLst>
+                <a:ext uri="{28A0092B-C50C-407E-A947-70E740481C1C}">
+                  <a14:useLocalDpi xmlns:a14="http://schemas.microsoft.com/office/drawing/2010/main" val="0"/>
+                </a:ext>
+              </a:extLst>
+            </a:blip>
+            <a:srcRect/>
+            <a:stretch>
+              <a:fillRect/>
+            </a:stretch>
+          </p:blipFill>
+          <p:spPr bwMode="auto">
+            <a:xfrm rot="21449824">
+              <a:off x="5880422" y="4152966"/>
+              <a:ext cx="857250" cy="1400175"/>
+            </a:xfrm>
+            <a:prstGeom prst="rect">
+              <a:avLst/>
+            </a:prstGeom>
+            <a:noFill/>
             <a:extLst>
-              <a:ext uri="{28A0092B-C50C-407E-A947-70E740481C1C}">
-                <a14:useLocalDpi xmlns:a14="http://schemas.microsoft.com/office/drawing/2010/main" val="0"/>
+              <a:ext uri="{909E8E84-426E-40DD-AFC4-6F175D3DCCD1}">
+                <a14:hiddenFill xmlns:a14="http://schemas.microsoft.com/office/drawing/2010/main">
+                  <a:solidFill>
+                    <a:srgbClr val="FFFFFF"/>
+                  </a:solidFill>
+                </a14:hiddenFill>
               </a:ext>
             </a:extLst>
-          </a:blip>
-          <a:srcRect/>
-          <a:stretch>
-            <a:fillRect/>
-          </a:stretch>
-        </p:blipFill>
-        <p:spPr bwMode="auto">
-          <a:xfrm rot="21449824">
-            <a:off x="5880422" y="4152966"/>
-            <a:ext cx="857250" cy="1400175"/>
-          </a:xfrm>
-          <a:prstGeom prst="rect">
-            <a:avLst/>
-          </a:prstGeom>
-          <a:noFill/>
-          <a:extLst>
-            <a:ext uri="{909E8E84-426E-40DD-AFC4-6F175D3DCCD1}">
-              <a14:hiddenFill xmlns:a14="http://schemas.microsoft.com/office/drawing/2010/main">
-                <a:solidFill>
-                  <a:srgbClr val="FFFFFF"/>
-                </a:solidFill>
-              </a14:hiddenFill>
-            </a:ext>
-          </a:extLst>
-        </p:spPr>
-      </p:pic>
-      <p:pic>
-        <p:nvPicPr>
-          <p:cNvPr id="10" name="Picture 10" descr="Image result for clam png"/>
-          <p:cNvPicPr>
-            <a:picLocks noChangeAspect="1" noChangeArrowheads="1"/>
-          </p:cNvPicPr>
-          <p:nvPr/>
-        </p:nvPicPr>
-        <p:blipFill>
-          <a:blip r:embed="rId6" cstate="print">
+          </p:spPr>
+        </p:pic>
+        <p:pic>
+          <p:nvPicPr>
+            <p:cNvPr id="10" name="Picture 10" descr="Image result for clam png"/>
+            <p:cNvPicPr>
+              <a:picLocks noChangeAspect="1" noChangeArrowheads="1"/>
+            </p:cNvPicPr>
+            <p:nvPr/>
+          </p:nvPicPr>
+          <p:blipFill>
+            <a:blip r:embed="rId6" cstate="print">
+              <a:extLst>
+                <a:ext uri="{28A0092B-C50C-407E-A947-70E740481C1C}">
+                  <a14:useLocalDpi xmlns:a14="http://schemas.microsoft.com/office/drawing/2010/main" val="0"/>
+                </a:ext>
+              </a:extLst>
+            </a:blip>
+            <a:srcRect/>
+            <a:stretch>
+              <a:fillRect/>
+            </a:stretch>
+          </p:blipFill>
+          <p:spPr bwMode="auto">
+            <a:xfrm>
+              <a:off x="5004728" y="5236500"/>
+              <a:ext cx="1039351" cy="656346"/>
+            </a:xfrm>
+            <a:prstGeom prst="rect">
+              <a:avLst/>
+            </a:prstGeom>
+            <a:noFill/>
             <a:extLst>
-              <a:ext uri="{28A0092B-C50C-407E-A947-70E740481C1C}">
-                <a14:useLocalDpi xmlns:a14="http://schemas.microsoft.com/office/drawing/2010/main" val="0"/>
+              <a:ext uri="{909E8E84-426E-40DD-AFC4-6F175D3DCCD1}">
+                <a14:hiddenFill xmlns:a14="http://schemas.microsoft.com/office/drawing/2010/main">
+                  <a:solidFill>
+                    <a:srgbClr val="FFFFFF"/>
+                  </a:solidFill>
+                </a14:hiddenFill>
               </a:ext>
             </a:extLst>
-          </a:blip>
-          <a:srcRect/>
-          <a:stretch>
-            <a:fillRect/>
-          </a:stretch>
-        </p:blipFill>
-        <p:spPr bwMode="auto">
-          <a:xfrm>
-            <a:off x="5004728" y="5236500"/>
-            <a:ext cx="1039351" cy="656346"/>
-          </a:xfrm>
-          <a:prstGeom prst="rect">
-            <a:avLst/>
-          </a:prstGeom>
-          <a:noFill/>
-          <a:extLst>
-            <a:ext uri="{909E8E84-426E-40DD-AFC4-6F175D3DCCD1}">
-              <a14:hiddenFill xmlns:a14="http://schemas.microsoft.com/office/drawing/2010/main">
-                <a:solidFill>
-                  <a:srgbClr val="FFFFFF"/>
-                </a:solidFill>
-              </a14:hiddenFill>
-            </a:ext>
-          </a:extLst>
-        </p:spPr>
-      </p:pic>
-      <p:pic>
-        <p:nvPicPr>
-          <p:cNvPr id="11" name="Picture 42" descr="Image result for clam png"/>
-          <p:cNvPicPr>
-            <a:picLocks noChangeAspect="1" noChangeArrowheads="1"/>
-          </p:cNvPicPr>
-          <p:nvPr/>
-        </p:nvPicPr>
-        <p:blipFill>
-          <a:blip r:embed="rId7" cstate="print">
+          </p:spPr>
+        </p:pic>
+        <p:pic>
+          <p:nvPicPr>
+            <p:cNvPr id="11" name="Picture 42" descr="Image result for clam png"/>
+            <p:cNvPicPr>
+              <a:picLocks noChangeAspect="1" noChangeArrowheads="1"/>
+            </p:cNvPicPr>
+            <p:nvPr/>
+          </p:nvPicPr>
+          <p:blipFill>
+            <a:blip r:embed="rId7" cstate="print">
+              <a:extLst>
+                <a:ext uri="{28A0092B-C50C-407E-A947-70E740481C1C}">
+                  <a14:useLocalDpi xmlns:a14="http://schemas.microsoft.com/office/drawing/2010/main" val="0"/>
+                </a:ext>
+              </a:extLst>
+            </a:blip>
+            <a:srcRect/>
+            <a:stretch>
+              <a:fillRect/>
+            </a:stretch>
+          </p:blipFill>
+          <p:spPr bwMode="auto">
+            <a:xfrm>
+              <a:off x="3993512" y="5598422"/>
+              <a:ext cx="586955" cy="297014"/>
+            </a:xfrm>
+            <a:prstGeom prst="rect">
+              <a:avLst/>
+            </a:prstGeom>
+            <a:noFill/>
             <a:extLst>
-              <a:ext uri="{28A0092B-C50C-407E-A947-70E740481C1C}">
-                <a14:useLocalDpi xmlns:a14="http://schemas.microsoft.com/office/drawing/2010/main" val="0"/>
+              <a:ext uri="{909E8E84-426E-40DD-AFC4-6F175D3DCCD1}">
+                <a14:hiddenFill xmlns:a14="http://schemas.microsoft.com/office/drawing/2010/main">
+                  <a:solidFill>
+                    <a:srgbClr val="FFFFFF"/>
+                  </a:solidFill>
+                </a14:hiddenFill>
               </a:ext>
             </a:extLst>
-          </a:blip>
-          <a:srcRect/>
-          <a:stretch>
-            <a:fillRect/>
-          </a:stretch>
-        </p:blipFill>
-        <p:spPr bwMode="auto">
+          </p:spPr>
+        </p:pic>
+        <p:sp>
+          <p:nvSpPr>
+            <p:cNvPr id="13" name="직사각형 12"/>
+            <p:cNvSpPr/>
+            <p:nvPr/>
+          </p:nvSpPr>
+          <p:spPr>
+            <a:xfrm>
+              <a:off x="2573057" y="1586606"/>
+              <a:ext cx="4517006" cy="1107996"/>
+            </a:xfrm>
+            <a:prstGeom prst="rect">
+              <a:avLst/>
+            </a:prstGeom>
+            <a:noFill/>
+          </p:spPr>
+          <p:txBody>
+            <a:bodyPr wrap="none" lIns="91440" tIns="45720" rIns="91440" bIns="45720">
+              <a:spAutoFit/>
+            </a:bodyPr>
+            <a:lstStyle/>
+            <a:p>
+              <a:pPr algn="ctr"/>
+              <a:r>
+                <a:rPr lang="en-US" altLang="ko-KR" sz="6600" b="1" cap="none" spc="0" dirty="0" smtClean="0">
+                  <a:ln w="12700">
+                    <a:solidFill>
+                      <a:schemeClr val="tx2">
+                        <a:lumMod val="75000"/>
+                      </a:schemeClr>
+                    </a:solidFill>
+                    <a:prstDash val="solid"/>
+                  </a:ln>
+                  <a:pattFill prst="dkUpDiag">
+                    <a:fgClr>
+                      <a:schemeClr val="tx2"/>
+                    </a:fgClr>
+                    <a:bgClr>
+                      <a:schemeClr val="tx2">
+                        <a:lumMod val="20000"/>
+                        <a:lumOff val="80000"/>
+                      </a:schemeClr>
+                    </a:bgClr>
+                  </a:pattFill>
+                  <a:effectLst>
+                    <a:outerShdw dist="38100" dir="2640000" algn="bl" rotWithShape="0">
+                      <a:schemeClr val="tx2">
+                        <a:lumMod val="75000"/>
+                      </a:schemeClr>
+                    </a:outerShdw>
+                  </a:effectLst>
+                </a:rPr>
+                <a:t>FLAPPY FISH</a:t>
+              </a:r>
+              <a:endParaRPr lang="en-US" altLang="ko-KR" sz="6600" b="1" cap="none" spc="0" dirty="0">
+                <a:ln w="12700">
+                  <a:solidFill>
+                    <a:schemeClr val="tx2">
+                      <a:lumMod val="75000"/>
+                    </a:schemeClr>
+                  </a:solidFill>
+                  <a:prstDash val="solid"/>
+                </a:ln>
+                <a:pattFill prst="dkUpDiag">
+                  <a:fgClr>
+                    <a:schemeClr val="tx2"/>
+                  </a:fgClr>
+                  <a:bgClr>
+                    <a:schemeClr val="tx2">
+                      <a:lumMod val="20000"/>
+                      <a:lumOff val="80000"/>
+                    </a:schemeClr>
+                  </a:bgClr>
+                </a:pattFill>
+                <a:effectLst>
+                  <a:outerShdw dist="38100" dir="2640000" algn="bl" rotWithShape="0">
+                    <a:schemeClr val="tx2">
+                      <a:lumMod val="75000"/>
+                    </a:schemeClr>
+                  </a:outerShdw>
+                </a:effectLst>
+              </a:endParaRPr>
+            </a:p>
+          </p:txBody>
+        </p:sp>
+      </p:grpSp>
+    </p:spTree>
+    <p:extLst>
+      <p:ext uri="{BB962C8B-B14F-4D97-AF65-F5344CB8AC3E}">
+        <p14:creationId xmlns:p14="http://schemas.microsoft.com/office/powerpoint/2010/main" val="1951169268"/>
+      </p:ext>
+    </p:extLst>
+  </p:cSld>
+  <p:clrMapOvr>
+    <a:masterClrMapping/>
+  </p:clrMapOvr>
+  <p:timing>
+    <p:tnLst>
+      <p:par>
+        <p:cTn id="1" dur="indefinite" restart="never" nodeType="tmRoot"/>
+      </p:par>
+    </p:tnLst>
+  </p:timing>
+</p:sld>
+</file>
+
+<file path=ppt/slides/slide15.xml><?xml version="1.0" encoding="utf-8"?>
+<p:sld xmlns:a="http://schemas.openxmlformats.org/drawingml/2006/main" xmlns:r="http://schemas.openxmlformats.org/officeDocument/2006/relationships" xmlns:p="http://schemas.openxmlformats.org/presentationml/2006/main">
+  <p:cSld>
+    <p:spTree>
+      <p:nvGrpSpPr>
+        <p:cNvPr id="1" name=""/>
+        <p:cNvGrpSpPr/>
+        <p:nvPr/>
+      </p:nvGrpSpPr>
+      <p:grpSpPr>
+        <a:xfrm>
+          <a:off x="0" y="0"/>
+          <a:ext cx="0" cy="0"/>
+          <a:chOff x="0" y="0"/>
+          <a:chExt cx="0" cy="0"/>
+        </a:xfrm>
+      </p:grpSpPr>
+      <p:grpSp>
+        <p:nvGrpSpPr>
+          <p:cNvPr id="3" name="그룹 2"/>
+          <p:cNvGrpSpPr/>
+          <p:nvPr/>
+        </p:nvGrpSpPr>
+        <p:grpSpPr>
           <a:xfrm>
-            <a:off x="3993512" y="5598422"/>
-            <a:ext cx="586955" cy="297014"/>
+            <a:off x="1953490" y="964277"/>
+            <a:ext cx="7739149" cy="5153890"/>
+            <a:chOff x="1953490" y="964277"/>
+            <a:chExt cx="7739149" cy="5153890"/>
           </a:xfrm>
-          <a:prstGeom prst="rect">
-            <a:avLst/>
-          </a:prstGeom>
-          <a:noFill/>
-          <a:extLst>
-            <a:ext uri="{909E8E84-426E-40DD-AFC4-6F175D3DCCD1}">
-              <a14:hiddenFill xmlns:a14="http://schemas.microsoft.com/office/drawing/2010/main">
-                <a:solidFill>
-                  <a:srgbClr val="FFFFFF"/>
-                </a:solidFill>
-              </a14:hiddenFill>
-            </a:ext>
-          </a:extLst>
-        </p:spPr>
-      </p:pic>
+        </p:grpSpPr>
+        <p:sp>
+          <p:nvSpPr>
+            <p:cNvPr id="2" name="Rectangle 1"/>
+            <p:cNvSpPr/>
+            <p:nvPr/>
+          </p:nvSpPr>
+          <p:spPr>
+            <a:xfrm>
+              <a:off x="1953490" y="964277"/>
+              <a:ext cx="7739149" cy="5153890"/>
+            </a:xfrm>
+            <a:prstGeom prst="rect">
+              <a:avLst/>
+            </a:prstGeom>
+            <a:gradFill flip="none" rotWithShape="1">
+              <a:gsLst>
+                <a:gs pos="0">
+                  <a:schemeClr val="accent1">
+                    <a:lumMod val="67000"/>
+                  </a:schemeClr>
+                </a:gs>
+                <a:gs pos="48000">
+                  <a:schemeClr val="accent1">
+                    <a:lumMod val="97000"/>
+                    <a:lumOff val="3000"/>
+                  </a:schemeClr>
+                </a:gs>
+                <a:gs pos="100000">
+                  <a:schemeClr val="accent1">
+                    <a:lumMod val="60000"/>
+                    <a:lumOff val="40000"/>
+                  </a:schemeClr>
+                </a:gs>
+              </a:gsLst>
+              <a:lin ang="16200000" scaled="1"/>
+              <a:tileRect/>
+            </a:gradFill>
+            <a:ln>
+              <a:noFill/>
+            </a:ln>
+          </p:spPr>
+          <p:style>
+            <a:lnRef idx="0">
+              <a:scrgbClr r="0" g="0" b="0"/>
+            </a:lnRef>
+            <a:fillRef idx="0">
+              <a:scrgbClr r="0" g="0" b="0"/>
+            </a:fillRef>
+            <a:effectRef idx="0">
+              <a:scrgbClr r="0" g="0" b="0"/>
+            </a:effectRef>
+            <a:fontRef idx="minor">
+              <a:schemeClr val="lt1"/>
+            </a:fontRef>
+          </p:style>
+          <p:txBody>
+            <a:bodyPr rtlCol="0" anchor="ctr"/>
+            <a:lstStyle/>
+            <a:p>
+              <a:pPr algn="ctr"/>
+              <a:endParaRPr lang="en-US"/>
+            </a:p>
+          </p:txBody>
+        </p:sp>
+        <p:pic>
+          <p:nvPicPr>
+            <p:cNvPr id="4" name="Picture 2" descr="Image result for seamless sand"/>
+            <p:cNvPicPr>
+              <a:picLocks noChangeAspect="1" noChangeArrowheads="1"/>
+            </p:cNvPicPr>
+            <p:nvPr/>
+          </p:nvPicPr>
+          <p:blipFill>
+            <a:blip r:embed="rId2">
+              <a:extLst>
+                <a:ext uri="{28A0092B-C50C-407E-A947-70E740481C1C}">
+                  <a14:useLocalDpi xmlns:a14="http://schemas.microsoft.com/office/drawing/2010/main" val="0"/>
+                </a:ext>
+              </a:extLst>
+            </a:blip>
+            <a:srcRect/>
+            <a:stretch>
+              <a:fillRect/>
+            </a:stretch>
+          </p:blipFill>
+          <p:spPr bwMode="auto">
+            <a:xfrm>
+              <a:off x="1953490" y="5252343"/>
+              <a:ext cx="4514850" cy="865824"/>
+            </a:xfrm>
+            <a:prstGeom prst="rect">
+              <a:avLst/>
+            </a:prstGeom>
+            <a:noFill/>
+            <a:extLst>
+              <a:ext uri="{909E8E84-426E-40DD-AFC4-6F175D3DCCD1}">
+                <a14:hiddenFill xmlns:a14="http://schemas.microsoft.com/office/drawing/2010/main">
+                  <a:solidFill>
+                    <a:srgbClr val="FFFFFF"/>
+                  </a:solidFill>
+                </a14:hiddenFill>
+              </a:ext>
+            </a:extLst>
+          </p:spPr>
+        </p:pic>
+        <p:pic>
+          <p:nvPicPr>
+            <p:cNvPr id="5" name="Picture 2" descr="Image result for seamless sand"/>
+            <p:cNvPicPr>
+              <a:picLocks noChangeAspect="1" noChangeArrowheads="1"/>
+            </p:cNvPicPr>
+            <p:nvPr/>
+          </p:nvPicPr>
+          <p:blipFill>
+            <a:blip r:embed="rId2">
+              <a:extLst>
+                <a:ext uri="{28A0092B-C50C-407E-A947-70E740481C1C}">
+                  <a14:useLocalDpi xmlns:a14="http://schemas.microsoft.com/office/drawing/2010/main" val="0"/>
+                </a:ext>
+              </a:extLst>
+            </a:blip>
+            <a:srcRect/>
+            <a:stretch>
+              <a:fillRect/>
+            </a:stretch>
+          </p:blipFill>
+          <p:spPr bwMode="auto">
+            <a:xfrm>
+              <a:off x="6468339" y="5252343"/>
+              <a:ext cx="3224299" cy="865824"/>
+            </a:xfrm>
+            <a:prstGeom prst="rect">
+              <a:avLst/>
+            </a:prstGeom>
+            <a:noFill/>
+            <a:extLst>
+              <a:ext uri="{909E8E84-426E-40DD-AFC4-6F175D3DCCD1}">
+                <a14:hiddenFill xmlns:a14="http://schemas.microsoft.com/office/drawing/2010/main">
+                  <a:solidFill>
+                    <a:srgbClr val="FFFFFF"/>
+                  </a:solidFill>
+                </a14:hiddenFill>
+              </a:ext>
+            </a:extLst>
+          </p:spPr>
+        </p:pic>
+        <p:pic>
+          <p:nvPicPr>
+            <p:cNvPr id="6" name="Picture 18" descr="Image result for seaweed png"/>
+            <p:cNvPicPr>
+              <a:picLocks noChangeAspect="1" noChangeArrowheads="1"/>
+            </p:cNvPicPr>
+            <p:nvPr/>
+          </p:nvPicPr>
+          <p:blipFill>
+            <a:blip r:embed="rId3" cstate="print">
+              <a:extLst>
+                <a:ext uri="{28A0092B-C50C-407E-A947-70E740481C1C}">
+                  <a14:useLocalDpi xmlns:a14="http://schemas.microsoft.com/office/drawing/2010/main" val="0"/>
+                </a:ext>
+              </a:extLst>
+            </a:blip>
+            <a:srcRect/>
+            <a:stretch>
+              <a:fillRect/>
+            </a:stretch>
+          </p:blipFill>
+          <p:spPr bwMode="auto">
+            <a:xfrm>
+              <a:off x="7681348" y="4382027"/>
+              <a:ext cx="1507115" cy="1507115"/>
+            </a:xfrm>
+            <a:prstGeom prst="rect">
+              <a:avLst/>
+            </a:prstGeom>
+            <a:noFill/>
+            <a:extLst>
+              <a:ext uri="{909E8E84-426E-40DD-AFC4-6F175D3DCCD1}">
+                <a14:hiddenFill xmlns:a14="http://schemas.microsoft.com/office/drawing/2010/main">
+                  <a:solidFill>
+                    <a:srgbClr val="FFFFFF"/>
+                  </a:solidFill>
+                </a14:hiddenFill>
+              </a:ext>
+            </a:extLst>
+          </p:spPr>
+        </p:pic>
+        <p:pic>
+          <p:nvPicPr>
+            <p:cNvPr id="7" name="Picture 30" descr="Image result for seaweed png"/>
+            <p:cNvPicPr>
+              <a:picLocks noChangeAspect="1" noChangeArrowheads="1"/>
+            </p:cNvPicPr>
+            <p:nvPr/>
+          </p:nvPicPr>
+          <p:blipFill>
+            <a:blip r:embed="rId4">
+              <a:extLst>
+                <a:ext uri="{28A0092B-C50C-407E-A947-70E740481C1C}">
+                  <a14:useLocalDpi xmlns:a14="http://schemas.microsoft.com/office/drawing/2010/main" val="0"/>
+                </a:ext>
+              </a:extLst>
+            </a:blip>
+            <a:srcRect/>
+            <a:stretch>
+              <a:fillRect/>
+            </a:stretch>
+          </p:blipFill>
+          <p:spPr bwMode="auto">
+            <a:xfrm>
+              <a:off x="6595827" y="3747786"/>
+              <a:ext cx="1162690" cy="1781409"/>
+            </a:xfrm>
+            <a:prstGeom prst="rect">
+              <a:avLst/>
+            </a:prstGeom>
+            <a:noFill/>
+            <a:extLst>
+              <a:ext uri="{909E8E84-426E-40DD-AFC4-6F175D3DCCD1}">
+                <a14:hiddenFill xmlns:a14="http://schemas.microsoft.com/office/drawing/2010/main">
+                  <a:solidFill>
+                    <a:srgbClr val="FFFFFF"/>
+                  </a:solidFill>
+                </a14:hiddenFill>
+              </a:ext>
+            </a:extLst>
+          </p:spPr>
+        </p:pic>
+        <p:pic>
+          <p:nvPicPr>
+            <p:cNvPr id="8" name="Picture 34" descr="Image result for seaweed png"/>
+            <p:cNvPicPr>
+              <a:picLocks noChangeAspect="1" noChangeArrowheads="1"/>
+            </p:cNvPicPr>
+            <p:nvPr/>
+          </p:nvPicPr>
+          <p:blipFill>
+            <a:blip r:embed="rId5">
+              <a:extLst>
+                <a:ext uri="{28A0092B-C50C-407E-A947-70E740481C1C}">
+                  <a14:useLocalDpi xmlns:a14="http://schemas.microsoft.com/office/drawing/2010/main" val="0"/>
+                </a:ext>
+              </a:extLst>
+            </a:blip>
+            <a:srcRect/>
+            <a:stretch>
+              <a:fillRect/>
+            </a:stretch>
+          </p:blipFill>
+          <p:spPr bwMode="auto">
+            <a:xfrm rot="21449824">
+              <a:off x="5880422" y="4152966"/>
+              <a:ext cx="857250" cy="1400175"/>
+            </a:xfrm>
+            <a:prstGeom prst="rect">
+              <a:avLst/>
+            </a:prstGeom>
+            <a:noFill/>
+            <a:extLst>
+              <a:ext uri="{909E8E84-426E-40DD-AFC4-6F175D3DCCD1}">
+                <a14:hiddenFill xmlns:a14="http://schemas.microsoft.com/office/drawing/2010/main">
+                  <a:solidFill>
+                    <a:srgbClr val="FFFFFF"/>
+                  </a:solidFill>
+                </a14:hiddenFill>
+              </a:ext>
+            </a:extLst>
+          </p:spPr>
+        </p:pic>
+        <p:pic>
+          <p:nvPicPr>
+            <p:cNvPr id="10" name="Picture 10" descr="Image result for clam png"/>
+            <p:cNvPicPr>
+              <a:picLocks noChangeAspect="1" noChangeArrowheads="1"/>
+            </p:cNvPicPr>
+            <p:nvPr/>
+          </p:nvPicPr>
+          <p:blipFill>
+            <a:blip r:embed="rId6" cstate="print">
+              <a:extLst>
+                <a:ext uri="{28A0092B-C50C-407E-A947-70E740481C1C}">
+                  <a14:useLocalDpi xmlns:a14="http://schemas.microsoft.com/office/drawing/2010/main" val="0"/>
+                </a:ext>
+              </a:extLst>
+            </a:blip>
+            <a:srcRect/>
+            <a:stretch>
+              <a:fillRect/>
+            </a:stretch>
+          </p:blipFill>
+          <p:spPr bwMode="auto">
+            <a:xfrm>
+              <a:off x="5004728" y="5236500"/>
+              <a:ext cx="1039351" cy="656346"/>
+            </a:xfrm>
+            <a:prstGeom prst="rect">
+              <a:avLst/>
+            </a:prstGeom>
+            <a:noFill/>
+            <a:extLst>
+              <a:ext uri="{909E8E84-426E-40DD-AFC4-6F175D3DCCD1}">
+                <a14:hiddenFill xmlns:a14="http://schemas.microsoft.com/office/drawing/2010/main">
+                  <a:solidFill>
+                    <a:srgbClr val="FFFFFF"/>
+                  </a:solidFill>
+                </a14:hiddenFill>
+              </a:ext>
+            </a:extLst>
+          </p:spPr>
+        </p:pic>
+        <p:pic>
+          <p:nvPicPr>
+            <p:cNvPr id="11" name="Picture 42" descr="Image result for clam png"/>
+            <p:cNvPicPr>
+              <a:picLocks noChangeAspect="1" noChangeArrowheads="1"/>
+            </p:cNvPicPr>
+            <p:nvPr/>
+          </p:nvPicPr>
+          <p:blipFill>
+            <a:blip r:embed="rId7" cstate="print">
+              <a:extLst>
+                <a:ext uri="{28A0092B-C50C-407E-A947-70E740481C1C}">
+                  <a14:useLocalDpi xmlns:a14="http://schemas.microsoft.com/office/drawing/2010/main" val="0"/>
+                </a:ext>
+              </a:extLst>
+            </a:blip>
+            <a:srcRect/>
+            <a:stretch>
+              <a:fillRect/>
+            </a:stretch>
+          </p:blipFill>
+          <p:spPr bwMode="auto">
+            <a:xfrm>
+              <a:off x="3993512" y="5598422"/>
+              <a:ext cx="586955" cy="297014"/>
+            </a:xfrm>
+            <a:prstGeom prst="rect">
+              <a:avLst/>
+            </a:prstGeom>
+            <a:noFill/>
+            <a:extLst>
+              <a:ext uri="{909E8E84-426E-40DD-AFC4-6F175D3DCCD1}">
+                <a14:hiddenFill xmlns:a14="http://schemas.microsoft.com/office/drawing/2010/main">
+                  <a:solidFill>
+                    <a:srgbClr val="FFFFFF"/>
+                  </a:solidFill>
+                </a14:hiddenFill>
+              </a:ext>
+            </a:extLst>
+          </p:spPr>
+        </p:pic>
+        <p:sp>
+          <p:nvSpPr>
+            <p:cNvPr id="12" name="직사각형 11"/>
+            <p:cNvSpPr/>
+            <p:nvPr/>
+          </p:nvSpPr>
+          <p:spPr>
+            <a:xfrm>
+              <a:off x="2746225" y="1608469"/>
+              <a:ext cx="4517006" cy="1107996"/>
+            </a:xfrm>
+            <a:prstGeom prst="rect">
+              <a:avLst/>
+            </a:prstGeom>
+            <a:noFill/>
+          </p:spPr>
+          <p:txBody>
+            <a:bodyPr wrap="none" lIns="91440" tIns="45720" rIns="91440" bIns="45720">
+              <a:spAutoFit/>
+            </a:bodyPr>
+            <a:lstStyle/>
+            <a:p>
+              <a:pPr algn="ctr"/>
+              <a:r>
+                <a:rPr lang="en-US" altLang="ko-KR" sz="6600" b="1" cap="none" spc="0" dirty="0" smtClean="0">
+                  <a:ln w="12700">
+                    <a:solidFill>
+                      <a:schemeClr val="tx2">
+                        <a:lumMod val="75000"/>
+                      </a:schemeClr>
+                    </a:solidFill>
+                    <a:prstDash val="solid"/>
+                  </a:ln>
+                  <a:pattFill prst="dkUpDiag">
+                    <a:fgClr>
+                      <a:schemeClr val="tx2"/>
+                    </a:fgClr>
+                    <a:bgClr>
+                      <a:schemeClr val="tx2">
+                        <a:lumMod val="20000"/>
+                        <a:lumOff val="80000"/>
+                      </a:schemeClr>
+                    </a:bgClr>
+                  </a:pattFill>
+                  <a:effectLst>
+                    <a:outerShdw dist="38100" dir="2640000" algn="bl" rotWithShape="0">
+                      <a:schemeClr val="tx2">
+                        <a:lumMod val="75000"/>
+                      </a:schemeClr>
+                    </a:outerShdw>
+                  </a:effectLst>
+                </a:rPr>
+                <a:t>FLAPPY FISH</a:t>
+              </a:r>
+              <a:endParaRPr lang="en-US" altLang="ko-KR" sz="6600" b="1" cap="none" spc="0" dirty="0">
+                <a:ln w="12700">
+                  <a:solidFill>
+                    <a:schemeClr val="tx2">
+                      <a:lumMod val="75000"/>
+                    </a:schemeClr>
+                  </a:solidFill>
+                  <a:prstDash val="solid"/>
+                </a:ln>
+                <a:pattFill prst="dkUpDiag">
+                  <a:fgClr>
+                    <a:schemeClr val="tx2"/>
+                  </a:fgClr>
+                  <a:bgClr>
+                    <a:schemeClr val="tx2">
+                      <a:lumMod val="20000"/>
+                      <a:lumOff val="80000"/>
+                    </a:schemeClr>
+                  </a:bgClr>
+                </a:pattFill>
+                <a:effectLst>
+                  <a:outerShdw dist="38100" dir="2640000" algn="bl" rotWithShape="0">
+                    <a:schemeClr val="tx2">
+                      <a:lumMod val="75000"/>
+                    </a:schemeClr>
+                  </a:outerShdw>
+                </a:effectLst>
+              </a:endParaRPr>
+            </a:p>
+          </p:txBody>
+        </p:sp>
+      </p:grpSp>
     </p:spTree>
     <p:extLst>
       <p:ext uri="{BB962C8B-B14F-4D97-AF65-F5344CB8AC3E}">
@@ -7869,7 +8543,7 @@
 </p:sld>
 </file>
 
-<file path=ppt/slides/slide15.xml><?xml version="1.0" encoding="utf-8"?>
+<file path=ppt/slides/slide16.xml><?xml version="1.0" encoding="utf-8"?>
 <p:sld xmlns:a="http://schemas.openxmlformats.org/drawingml/2006/main" xmlns:r="http://schemas.openxmlformats.org/officeDocument/2006/relationships" xmlns:p="http://schemas.openxmlformats.org/presentationml/2006/main">
   <p:cSld>
     <p:spTree>
@@ -7991,7 +8665,7 @@
 </p:sld>
 </file>
 
-<file path=ppt/slides/slide16.xml><?xml version="1.0" encoding="utf-8"?>
+<file path=ppt/slides/slide17.xml><?xml version="1.0" encoding="utf-8"?>
 <p:sld xmlns:a="http://schemas.openxmlformats.org/drawingml/2006/main" xmlns:r="http://schemas.openxmlformats.org/officeDocument/2006/relationships" xmlns:p="http://schemas.openxmlformats.org/presentationml/2006/main">
   <p:cSld>
     <p:spTree>
@@ -11449,7 +12123,7 @@
 </p:sld>
 </file>
 
-<file path=ppt/slides/slide17.xml><?xml version="1.0" encoding="utf-8"?>
+<file path=ppt/slides/slide18.xml><?xml version="1.0" encoding="utf-8"?>
 <p:sld xmlns:a="http://schemas.openxmlformats.org/drawingml/2006/main" xmlns:r="http://schemas.openxmlformats.org/officeDocument/2006/relationships" xmlns:p="http://schemas.openxmlformats.org/presentationml/2006/main">
   <p:cSld>
     <p:spTree>
@@ -11772,7 +12446,7 @@
 </p:sld>
 </file>
 
-<file path=ppt/slides/slide18.xml><?xml version="1.0" encoding="utf-8"?>
+<file path=ppt/slides/slide19.xml><?xml version="1.0" encoding="utf-8"?>
 <p:sld xmlns:a="http://schemas.openxmlformats.org/drawingml/2006/main" xmlns:r="http://schemas.openxmlformats.org/officeDocument/2006/relationships" xmlns:p="http://schemas.openxmlformats.org/presentationml/2006/main">
   <p:cSld>
     <p:spTree>

</xml_diff>

<commit_message>
shark collision checked modified, game restart
</commit_message>
<xml_diff>
--- a/FlappyFish/image.pptx
+++ b/FlappyFish/image.pptx
@@ -22,8 +22,9 @@
     <p:sldId id="269" r:id="rId16"/>
     <p:sldId id="267" r:id="rId17"/>
     <p:sldId id="270" r:id="rId18"/>
-    <p:sldId id="272" r:id="rId19"/>
-    <p:sldId id="273" r:id="rId20"/>
+    <p:sldId id="276" r:id="rId19"/>
+    <p:sldId id="272" r:id="rId20"/>
+    <p:sldId id="273" r:id="rId21"/>
   </p:sldIdLst>
   <p:sldSz cx="12192000" cy="6858000"/>
   <p:notesSz cx="6858000" cy="9144000"/>
@@ -261,7 +262,7 @@
           <a:p>
             <a:fld id="{9CDEF8F9-7F91-4CA6-AEBA-A09B6AB566B9}" type="datetimeFigureOut">
               <a:rPr lang="en-US" smtClean="0"/>
-              <a:t>1/8/2018</a:t>
+              <a:t>1/9/2018</a:t>
             </a:fld>
             <a:endParaRPr lang="en-US" dirty="0"/>
           </a:p>
@@ -431,7 +432,7 @@
           <a:p>
             <a:fld id="{9CDEF8F9-7F91-4CA6-AEBA-A09B6AB566B9}" type="datetimeFigureOut">
               <a:rPr lang="en-US" smtClean="0"/>
-              <a:t>1/8/2018</a:t>
+              <a:t>1/9/2018</a:t>
             </a:fld>
             <a:endParaRPr lang="en-US" dirty="0"/>
           </a:p>
@@ -611,7 +612,7 @@
           <a:p>
             <a:fld id="{9CDEF8F9-7F91-4CA6-AEBA-A09B6AB566B9}" type="datetimeFigureOut">
               <a:rPr lang="en-US" smtClean="0"/>
-              <a:t>1/8/2018</a:t>
+              <a:t>1/9/2018</a:t>
             </a:fld>
             <a:endParaRPr lang="en-US" dirty="0"/>
           </a:p>
@@ -781,7 +782,7 @@
           <a:p>
             <a:fld id="{9CDEF8F9-7F91-4CA6-AEBA-A09B6AB566B9}" type="datetimeFigureOut">
               <a:rPr lang="en-US" smtClean="0"/>
-              <a:t>1/8/2018</a:t>
+              <a:t>1/9/2018</a:t>
             </a:fld>
             <a:endParaRPr lang="en-US" dirty="0"/>
           </a:p>
@@ -1027,7 +1028,7 @@
           <a:p>
             <a:fld id="{9CDEF8F9-7F91-4CA6-AEBA-A09B6AB566B9}" type="datetimeFigureOut">
               <a:rPr lang="en-US" smtClean="0"/>
-              <a:t>1/8/2018</a:t>
+              <a:t>1/9/2018</a:t>
             </a:fld>
             <a:endParaRPr lang="en-US" dirty="0"/>
           </a:p>
@@ -1259,7 +1260,7 @@
           <a:p>
             <a:fld id="{9CDEF8F9-7F91-4CA6-AEBA-A09B6AB566B9}" type="datetimeFigureOut">
               <a:rPr lang="en-US" smtClean="0"/>
-              <a:t>1/8/2018</a:t>
+              <a:t>1/9/2018</a:t>
             </a:fld>
             <a:endParaRPr lang="en-US" dirty="0"/>
           </a:p>
@@ -1626,7 +1627,7 @@
           <a:p>
             <a:fld id="{9CDEF8F9-7F91-4CA6-AEBA-A09B6AB566B9}" type="datetimeFigureOut">
               <a:rPr lang="en-US" smtClean="0"/>
-              <a:t>1/8/2018</a:t>
+              <a:t>1/9/2018</a:t>
             </a:fld>
             <a:endParaRPr lang="en-US" dirty="0"/>
           </a:p>
@@ -1744,7 +1745,7 @@
           <a:p>
             <a:fld id="{9CDEF8F9-7F91-4CA6-AEBA-A09B6AB566B9}" type="datetimeFigureOut">
               <a:rPr lang="en-US" smtClean="0"/>
-              <a:t>1/8/2018</a:t>
+              <a:t>1/9/2018</a:t>
             </a:fld>
             <a:endParaRPr lang="en-US" dirty="0"/>
           </a:p>
@@ -1839,7 +1840,7 @@
           <a:p>
             <a:fld id="{9CDEF8F9-7F91-4CA6-AEBA-A09B6AB566B9}" type="datetimeFigureOut">
               <a:rPr lang="en-US" smtClean="0"/>
-              <a:t>1/8/2018</a:t>
+              <a:t>1/9/2018</a:t>
             </a:fld>
             <a:endParaRPr lang="en-US" dirty="0"/>
           </a:p>
@@ -2116,7 +2117,7 @@
           <a:p>
             <a:fld id="{9CDEF8F9-7F91-4CA6-AEBA-A09B6AB566B9}" type="datetimeFigureOut">
               <a:rPr lang="en-US" smtClean="0"/>
-              <a:t>1/8/2018</a:t>
+              <a:t>1/9/2018</a:t>
             </a:fld>
             <a:endParaRPr lang="en-US" dirty="0"/>
           </a:p>
@@ -2369,7 +2370,7 @@
           <a:p>
             <a:fld id="{9CDEF8F9-7F91-4CA6-AEBA-A09B6AB566B9}" type="datetimeFigureOut">
               <a:rPr lang="en-US" smtClean="0"/>
-              <a:t>1/8/2018</a:t>
+              <a:t>1/9/2018</a:t>
             </a:fld>
             <a:endParaRPr lang="en-US" dirty="0"/>
           </a:p>
@@ -2582,7 +2583,7 @@
           <a:p>
             <a:fld id="{9CDEF8F9-7F91-4CA6-AEBA-A09B6AB566B9}" type="datetimeFigureOut">
               <a:rPr lang="en-US" smtClean="0"/>
-              <a:t>1/8/2018</a:t>
+              <a:t>1/9/2018</a:t>
             </a:fld>
             <a:endParaRPr lang="en-US" dirty="0"/>
           </a:p>
@@ -12140,6 +12141,240 @@
           <a:chExt cx="0" cy="0"/>
         </a:xfrm>
       </p:grpSpPr>
+      <p:grpSp>
+        <p:nvGrpSpPr>
+          <p:cNvPr id="5" name="그룹 4"/>
+          <p:cNvGrpSpPr/>
+          <p:nvPr/>
+        </p:nvGrpSpPr>
+        <p:grpSpPr>
+          <a:xfrm>
+            <a:off x="2687729" y="1366127"/>
+            <a:ext cx="6483927" cy="4197927"/>
+            <a:chOff x="2687729" y="1366127"/>
+            <a:chExt cx="6483927" cy="4197927"/>
+          </a:xfrm>
+        </p:grpSpPr>
+        <p:sp>
+          <p:nvSpPr>
+            <p:cNvPr id="2" name="Rounded Rectangle 2"/>
+            <p:cNvSpPr/>
+            <p:nvPr/>
+          </p:nvSpPr>
+          <p:spPr>
+            <a:xfrm>
+              <a:off x="2687729" y="1366127"/>
+              <a:ext cx="6483927" cy="4197927"/>
+            </a:xfrm>
+            <a:prstGeom prst="roundRect">
+              <a:avLst/>
+            </a:prstGeom>
+            <a:solidFill>
+              <a:schemeClr val="accent1">
+                <a:lumMod val="20000"/>
+                <a:lumOff val="80000"/>
+              </a:schemeClr>
+            </a:solidFill>
+            <a:ln>
+              <a:solidFill>
+                <a:schemeClr val="accent1">
+                  <a:lumMod val="20000"/>
+                  <a:lumOff val="80000"/>
+                </a:schemeClr>
+              </a:solidFill>
+            </a:ln>
+          </p:spPr>
+          <p:style>
+            <a:lnRef idx="2">
+              <a:schemeClr val="accent1">
+                <a:shade val="50000"/>
+              </a:schemeClr>
+            </a:lnRef>
+            <a:fillRef idx="1">
+              <a:schemeClr val="accent1"/>
+            </a:fillRef>
+            <a:effectRef idx="0">
+              <a:schemeClr val="accent1"/>
+            </a:effectRef>
+            <a:fontRef idx="minor">
+              <a:schemeClr val="lt1"/>
+            </a:fontRef>
+          </p:style>
+          <p:txBody>
+            <a:bodyPr rtlCol="0" anchor="ctr"/>
+            <a:lstStyle/>
+            <a:p>
+              <a:pPr algn="ctr"/>
+              <a:endParaRPr lang="en-US"/>
+            </a:p>
+          </p:txBody>
+        </p:sp>
+        <p:sp>
+          <p:nvSpPr>
+            <p:cNvPr id="3" name="직사각형 2"/>
+            <p:cNvSpPr/>
+            <p:nvPr/>
+          </p:nvSpPr>
+          <p:spPr>
+            <a:xfrm>
+              <a:off x="2815987" y="2281338"/>
+              <a:ext cx="6227409" cy="830997"/>
+            </a:xfrm>
+            <a:prstGeom prst="rect">
+              <a:avLst/>
+            </a:prstGeom>
+            <a:noFill/>
+          </p:spPr>
+          <p:txBody>
+            <a:bodyPr wrap="none" lIns="91440" tIns="45720" rIns="91440" bIns="45720">
+              <a:spAutoFit/>
+            </a:bodyPr>
+            <a:lstStyle/>
+            <a:p>
+              <a:pPr algn="ctr"/>
+              <a:r>
+                <a:rPr lang="en-US" altLang="ko-KR" sz="4800" b="1" cap="none" spc="0" dirty="0" smtClean="0">
+                  <a:ln w="12700">
+                    <a:solidFill>
+                      <a:schemeClr val="accent1"/>
+                    </a:solidFill>
+                    <a:prstDash val="solid"/>
+                  </a:ln>
+                  <a:pattFill prst="pct50">
+                    <a:fgClr>
+                      <a:schemeClr val="accent1"/>
+                    </a:fgClr>
+                    <a:bgClr>
+                      <a:schemeClr val="accent1">
+                        <a:lumMod val="20000"/>
+                        <a:lumOff val="80000"/>
+                      </a:schemeClr>
+                    </a:bgClr>
+                  </a:pattFill>
+                  <a:effectLst>
+                    <a:outerShdw dist="38100" dir="2640000" algn="bl" rotWithShape="0">
+                      <a:schemeClr val="accent1"/>
+                    </a:outerShdw>
+                  </a:effectLst>
+                </a:rPr>
+                <a:t>Please enter your name</a:t>
+              </a:r>
+              <a:endParaRPr lang="en-US" altLang="ko-KR" sz="4800" b="1" cap="none" spc="0" dirty="0">
+                <a:ln w="12700">
+                  <a:solidFill>
+                    <a:schemeClr val="accent1"/>
+                  </a:solidFill>
+                  <a:prstDash val="solid"/>
+                </a:ln>
+                <a:pattFill prst="pct50">
+                  <a:fgClr>
+                    <a:schemeClr val="accent1"/>
+                  </a:fgClr>
+                  <a:bgClr>
+                    <a:schemeClr val="accent1">
+                      <a:lumMod val="20000"/>
+                      <a:lumOff val="80000"/>
+                    </a:schemeClr>
+                  </a:bgClr>
+                </a:pattFill>
+                <a:effectLst>
+                  <a:outerShdw dist="38100" dir="2640000" algn="bl" rotWithShape="0">
+                    <a:schemeClr val="accent1"/>
+                  </a:outerShdw>
+                </a:effectLst>
+              </a:endParaRPr>
+            </a:p>
+          </p:txBody>
+        </p:sp>
+        <p:sp>
+          <p:nvSpPr>
+            <p:cNvPr id="4" name="직사각형 3"/>
+            <p:cNvSpPr/>
+            <p:nvPr/>
+          </p:nvSpPr>
+          <p:spPr>
+            <a:xfrm>
+              <a:off x="4152117" y="1569817"/>
+              <a:ext cx="3739485" cy="923330"/>
+            </a:xfrm>
+            <a:prstGeom prst="rect">
+              <a:avLst/>
+            </a:prstGeom>
+            <a:noFill/>
+          </p:spPr>
+          <p:txBody>
+            <a:bodyPr wrap="none" lIns="91440" tIns="45720" rIns="91440" bIns="45720">
+              <a:spAutoFit/>
+            </a:bodyPr>
+            <a:lstStyle/>
+            <a:p>
+              <a:pPr algn="ctr"/>
+              <a:r>
+                <a:rPr lang="en-US" altLang="ko-KR" sz="5400" b="1" dirty="0" smtClean="0">
+                  <a:ln w="22225">
+                    <a:solidFill>
+                      <a:schemeClr val="accent2"/>
+                    </a:solidFill>
+                    <a:prstDash val="solid"/>
+                  </a:ln>
+                  <a:solidFill>
+                    <a:schemeClr val="accent2">
+                      <a:lumMod val="40000"/>
+                      <a:lumOff val="60000"/>
+                    </a:schemeClr>
+                  </a:solidFill>
+                </a:rPr>
+                <a:t>GAME OVER</a:t>
+              </a:r>
+              <a:endParaRPr lang="en-US" altLang="ko-KR" sz="5400" b="1" cap="none" spc="0" dirty="0">
+                <a:ln w="22225">
+                  <a:solidFill>
+                    <a:schemeClr val="accent2"/>
+                  </a:solidFill>
+                  <a:prstDash val="solid"/>
+                </a:ln>
+                <a:solidFill>
+                  <a:schemeClr val="accent2">
+                    <a:lumMod val="40000"/>
+                    <a:lumOff val="60000"/>
+                  </a:schemeClr>
+                </a:solidFill>
+                <a:effectLst/>
+              </a:endParaRPr>
+            </a:p>
+          </p:txBody>
+        </p:sp>
+      </p:grpSp>
+    </p:spTree>
+    <p:extLst>
+      <p:ext uri="{BB962C8B-B14F-4D97-AF65-F5344CB8AC3E}">
+        <p14:creationId xmlns:p14="http://schemas.microsoft.com/office/powerpoint/2010/main" val="2708809739"/>
+      </p:ext>
+    </p:extLst>
+  </p:cSld>
+  <p:clrMapOvr>
+    <a:masterClrMapping/>
+  </p:clrMapOvr>
+</p:sld>
+</file>
+
+<file path=ppt/slides/slide19.xml><?xml version="1.0" encoding="utf-8"?>
+<p:sld xmlns:a="http://schemas.openxmlformats.org/drawingml/2006/main" xmlns:r="http://schemas.openxmlformats.org/officeDocument/2006/relationships" xmlns:p="http://schemas.openxmlformats.org/presentationml/2006/main">
+  <p:cSld>
+    <p:spTree>
+      <p:nvGrpSpPr>
+        <p:cNvPr id="1" name=""/>
+        <p:cNvGrpSpPr/>
+        <p:nvPr/>
+      </p:nvGrpSpPr>
+      <p:grpSpPr>
+        <a:xfrm>
+          <a:off x="0" y="0"/>
+          <a:ext cx="0" cy="0"/>
+          <a:chOff x="0" y="0"/>
+          <a:chExt cx="0" cy="0"/>
+        </a:xfrm>
+      </p:grpSpPr>
       <p:sp>
         <p:nvSpPr>
           <p:cNvPr id="2" name="Rectangle 1"/>
@@ -12437,250 +12672,6 @@
     <p:extLst>
       <p:ext uri="{BB962C8B-B14F-4D97-AF65-F5344CB8AC3E}">
         <p14:creationId xmlns:p14="http://schemas.microsoft.com/office/powerpoint/2010/main" val="668744943"/>
-      </p:ext>
-    </p:extLst>
-  </p:cSld>
-  <p:clrMapOvr>
-    <a:masterClrMapping/>
-  </p:clrMapOvr>
-</p:sld>
-</file>
-
-<file path=ppt/slides/slide19.xml><?xml version="1.0" encoding="utf-8"?>
-<p:sld xmlns:a="http://schemas.openxmlformats.org/drawingml/2006/main" xmlns:r="http://schemas.openxmlformats.org/officeDocument/2006/relationships" xmlns:p="http://schemas.openxmlformats.org/presentationml/2006/main">
-  <p:cSld>
-    <p:spTree>
-      <p:nvGrpSpPr>
-        <p:cNvPr id="1" name=""/>
-        <p:cNvGrpSpPr/>
-        <p:nvPr/>
-      </p:nvGrpSpPr>
-      <p:grpSpPr>
-        <a:xfrm>
-          <a:off x="0" y="0"/>
-          <a:ext cx="0" cy="0"/>
-          <a:chOff x="0" y="0"/>
-          <a:chExt cx="0" cy="0"/>
-        </a:xfrm>
-      </p:grpSpPr>
-      <p:sp>
-        <p:nvSpPr>
-          <p:cNvPr id="2" name="Rectangle 1"/>
-          <p:cNvSpPr/>
-          <p:nvPr/>
-        </p:nvSpPr>
-        <p:spPr>
-          <a:xfrm>
-            <a:off x="2019992" y="914400"/>
-            <a:ext cx="7739149" cy="5153890"/>
-          </a:xfrm>
-          <a:prstGeom prst="rect">
-            <a:avLst/>
-          </a:prstGeom>
-          <a:gradFill flip="none" rotWithShape="1">
-            <a:gsLst>
-              <a:gs pos="0">
-                <a:schemeClr val="accent1">
-                  <a:lumMod val="67000"/>
-                </a:schemeClr>
-              </a:gs>
-              <a:gs pos="48000">
-                <a:schemeClr val="accent1">
-                  <a:lumMod val="97000"/>
-                  <a:lumOff val="3000"/>
-                </a:schemeClr>
-              </a:gs>
-              <a:gs pos="100000">
-                <a:schemeClr val="accent1">
-                  <a:lumMod val="60000"/>
-                  <a:lumOff val="40000"/>
-                </a:schemeClr>
-              </a:gs>
-            </a:gsLst>
-            <a:lin ang="16200000" scaled="1"/>
-            <a:tileRect/>
-          </a:gradFill>
-          <a:ln>
-            <a:noFill/>
-          </a:ln>
-        </p:spPr>
-        <p:style>
-          <a:lnRef idx="0">
-            <a:scrgbClr r="0" g="0" b="0"/>
-          </a:lnRef>
-          <a:fillRef idx="0">
-            <a:scrgbClr r="0" g="0" b="0"/>
-          </a:fillRef>
-          <a:effectRef idx="0">
-            <a:scrgbClr r="0" g="0" b="0"/>
-          </a:effectRef>
-          <a:fontRef idx="minor">
-            <a:schemeClr val="lt1"/>
-          </a:fontRef>
-        </p:style>
-        <p:txBody>
-          <a:bodyPr rtlCol="0" anchor="ctr"/>
-          <a:lstStyle/>
-          <a:p>
-            <a:pPr algn="ctr"/>
-            <a:endParaRPr lang="en-US"/>
-          </a:p>
-        </p:txBody>
-      </p:sp>
-      <p:sp>
-        <p:nvSpPr>
-          <p:cNvPr id="3" name="Rounded Rectangle 2"/>
-          <p:cNvSpPr/>
-          <p:nvPr/>
-        </p:nvSpPr>
-        <p:spPr>
-          <a:xfrm>
-            <a:off x="2687729" y="1366127"/>
-            <a:ext cx="6483927" cy="4197927"/>
-          </a:xfrm>
-          <a:prstGeom prst="roundRect">
-            <a:avLst/>
-          </a:prstGeom>
-          <a:solidFill>
-            <a:schemeClr val="accent1">
-              <a:lumMod val="20000"/>
-              <a:lumOff val="80000"/>
-            </a:schemeClr>
-          </a:solidFill>
-          <a:ln>
-            <a:solidFill>
-              <a:schemeClr val="accent1">
-                <a:lumMod val="20000"/>
-                <a:lumOff val="80000"/>
-              </a:schemeClr>
-            </a:solidFill>
-          </a:ln>
-        </p:spPr>
-        <p:style>
-          <a:lnRef idx="2">
-            <a:schemeClr val="accent1">
-              <a:shade val="50000"/>
-            </a:schemeClr>
-          </a:lnRef>
-          <a:fillRef idx="1">
-            <a:schemeClr val="accent1"/>
-          </a:fillRef>
-          <a:effectRef idx="0">
-            <a:schemeClr val="accent1"/>
-          </a:effectRef>
-          <a:fontRef idx="minor">
-            <a:schemeClr val="lt1"/>
-          </a:fontRef>
-        </p:style>
-        <p:txBody>
-          <a:bodyPr rtlCol="0" anchor="ctr"/>
-          <a:lstStyle/>
-          <a:p>
-            <a:pPr algn="ctr"/>
-            <a:endParaRPr lang="en-US"/>
-          </a:p>
-        </p:txBody>
-      </p:sp>
-      <p:sp>
-        <p:nvSpPr>
-          <p:cNvPr id="4" name="Rectangle 3"/>
-          <p:cNvSpPr/>
-          <p:nvPr/>
-        </p:nvSpPr>
-        <p:spPr>
-          <a:xfrm>
-            <a:off x="4477819" y="1366127"/>
-            <a:ext cx="2657009" cy="769441"/>
-          </a:xfrm>
-          <a:prstGeom prst="rect">
-            <a:avLst/>
-          </a:prstGeom>
-          <a:noFill/>
-        </p:spPr>
-        <p:txBody>
-          <a:bodyPr wrap="none" lIns="91440" tIns="45720" rIns="91440" bIns="45720">
-            <a:spAutoFit/>
-          </a:bodyPr>
-          <a:lstStyle/>
-          <a:p>
-            <a:pPr algn="ctr"/>
-            <a:r>
-              <a:rPr lang="en-US" sz="4400" b="1" dirty="0" smtClean="0">
-                <a:ln w="0"/>
-                <a:solidFill>
-                  <a:srgbClr val="FF0000"/>
-                </a:solidFill>
-                <a:effectLst>
-                  <a:outerShdw blurRad="38100" dist="19050" dir="2700000" algn="tl" rotWithShape="0">
-                    <a:schemeClr val="dk1">
-                      <a:alpha val="40000"/>
-                    </a:schemeClr>
-                  </a:outerShdw>
-                </a:effectLst>
-              </a:rPr>
-              <a:t>High Score</a:t>
-            </a:r>
-            <a:endParaRPr lang="en-US" sz="4400" b="1" cap="none" spc="0" dirty="0">
-              <a:ln w="0"/>
-              <a:solidFill>
-                <a:srgbClr val="FF0000"/>
-              </a:solidFill>
-              <a:effectLst>
-                <a:outerShdw blurRad="38100" dist="19050" dir="2700000" algn="tl" rotWithShape="0">
-                  <a:schemeClr val="dk1">
-                    <a:alpha val="40000"/>
-                  </a:schemeClr>
-                </a:outerShdw>
-              </a:effectLst>
-            </a:endParaRPr>
-          </a:p>
-        </p:txBody>
-      </p:sp>
-      <p:pic>
-        <p:nvPicPr>
-          <p:cNvPr id="3074" name="Picture 2" descr="Image result for happy png"/>
-          <p:cNvPicPr>
-            <a:picLocks noChangeAspect="1" noChangeArrowheads="1"/>
-          </p:cNvPicPr>
-          <p:nvPr/>
-        </p:nvPicPr>
-        <p:blipFill>
-          <a:blip r:embed="rId2" cstate="print">
-            <a:extLst>
-              <a:ext uri="{28A0092B-C50C-407E-A947-70E740481C1C}">
-                <a14:useLocalDpi xmlns:a14="http://schemas.microsoft.com/office/drawing/2010/main" val="0"/>
-              </a:ext>
-            </a:extLst>
-          </a:blip>
-          <a:srcRect/>
-          <a:stretch>
-            <a:fillRect/>
-          </a:stretch>
-        </p:blipFill>
-        <p:spPr bwMode="auto">
-          <a:xfrm>
-            <a:off x="8368549" y="4730470"/>
-            <a:ext cx="1240964" cy="1337820"/>
-          </a:xfrm>
-          <a:prstGeom prst="rect">
-            <a:avLst/>
-          </a:prstGeom>
-          <a:noFill/>
-          <a:extLst>
-            <a:ext uri="{909E8E84-426E-40DD-AFC4-6F175D3DCCD1}">
-              <a14:hiddenFill xmlns:a14="http://schemas.microsoft.com/office/drawing/2010/main">
-                <a:solidFill>
-                  <a:srgbClr val="FFFFFF"/>
-                </a:solidFill>
-              </a14:hiddenFill>
-            </a:ext>
-          </a:extLst>
-        </p:spPr>
-      </p:pic>
-    </p:spTree>
-    <p:extLst>
-      <p:ext uri="{BB962C8B-B14F-4D97-AF65-F5344CB8AC3E}">
-        <p14:creationId xmlns:p14="http://schemas.microsoft.com/office/powerpoint/2010/main" val="1257060797"/>
       </p:ext>
     </p:extLst>
   </p:cSld>
@@ -14165,6 +14156,250 @@
       </p:par>
     </p:tnLst>
   </p:timing>
+</p:sld>
+</file>
+
+<file path=ppt/slides/slide20.xml><?xml version="1.0" encoding="utf-8"?>
+<p:sld xmlns:a="http://schemas.openxmlformats.org/drawingml/2006/main" xmlns:r="http://schemas.openxmlformats.org/officeDocument/2006/relationships" xmlns:p="http://schemas.openxmlformats.org/presentationml/2006/main">
+  <p:cSld>
+    <p:spTree>
+      <p:nvGrpSpPr>
+        <p:cNvPr id="1" name=""/>
+        <p:cNvGrpSpPr/>
+        <p:nvPr/>
+      </p:nvGrpSpPr>
+      <p:grpSpPr>
+        <a:xfrm>
+          <a:off x="0" y="0"/>
+          <a:ext cx="0" cy="0"/>
+          <a:chOff x="0" y="0"/>
+          <a:chExt cx="0" cy="0"/>
+        </a:xfrm>
+      </p:grpSpPr>
+      <p:sp>
+        <p:nvSpPr>
+          <p:cNvPr id="2" name="Rectangle 1"/>
+          <p:cNvSpPr/>
+          <p:nvPr/>
+        </p:nvSpPr>
+        <p:spPr>
+          <a:xfrm>
+            <a:off x="2019992" y="914400"/>
+            <a:ext cx="7739149" cy="5153890"/>
+          </a:xfrm>
+          <a:prstGeom prst="rect">
+            <a:avLst/>
+          </a:prstGeom>
+          <a:gradFill flip="none" rotWithShape="1">
+            <a:gsLst>
+              <a:gs pos="0">
+                <a:schemeClr val="accent1">
+                  <a:lumMod val="67000"/>
+                </a:schemeClr>
+              </a:gs>
+              <a:gs pos="48000">
+                <a:schemeClr val="accent1">
+                  <a:lumMod val="97000"/>
+                  <a:lumOff val="3000"/>
+                </a:schemeClr>
+              </a:gs>
+              <a:gs pos="100000">
+                <a:schemeClr val="accent1">
+                  <a:lumMod val="60000"/>
+                  <a:lumOff val="40000"/>
+                </a:schemeClr>
+              </a:gs>
+            </a:gsLst>
+            <a:lin ang="16200000" scaled="1"/>
+            <a:tileRect/>
+          </a:gradFill>
+          <a:ln>
+            <a:noFill/>
+          </a:ln>
+        </p:spPr>
+        <p:style>
+          <a:lnRef idx="0">
+            <a:scrgbClr r="0" g="0" b="0"/>
+          </a:lnRef>
+          <a:fillRef idx="0">
+            <a:scrgbClr r="0" g="0" b="0"/>
+          </a:fillRef>
+          <a:effectRef idx="0">
+            <a:scrgbClr r="0" g="0" b="0"/>
+          </a:effectRef>
+          <a:fontRef idx="minor">
+            <a:schemeClr val="lt1"/>
+          </a:fontRef>
+        </p:style>
+        <p:txBody>
+          <a:bodyPr rtlCol="0" anchor="ctr"/>
+          <a:lstStyle/>
+          <a:p>
+            <a:pPr algn="ctr"/>
+            <a:endParaRPr lang="en-US"/>
+          </a:p>
+        </p:txBody>
+      </p:sp>
+      <p:sp>
+        <p:nvSpPr>
+          <p:cNvPr id="3" name="Rounded Rectangle 2"/>
+          <p:cNvSpPr/>
+          <p:nvPr/>
+        </p:nvSpPr>
+        <p:spPr>
+          <a:xfrm>
+            <a:off x="2687729" y="1366127"/>
+            <a:ext cx="6483927" cy="4197927"/>
+          </a:xfrm>
+          <a:prstGeom prst="roundRect">
+            <a:avLst/>
+          </a:prstGeom>
+          <a:solidFill>
+            <a:schemeClr val="accent1">
+              <a:lumMod val="20000"/>
+              <a:lumOff val="80000"/>
+            </a:schemeClr>
+          </a:solidFill>
+          <a:ln>
+            <a:solidFill>
+              <a:schemeClr val="accent1">
+                <a:lumMod val="20000"/>
+                <a:lumOff val="80000"/>
+              </a:schemeClr>
+            </a:solidFill>
+          </a:ln>
+        </p:spPr>
+        <p:style>
+          <a:lnRef idx="2">
+            <a:schemeClr val="accent1">
+              <a:shade val="50000"/>
+            </a:schemeClr>
+          </a:lnRef>
+          <a:fillRef idx="1">
+            <a:schemeClr val="accent1"/>
+          </a:fillRef>
+          <a:effectRef idx="0">
+            <a:schemeClr val="accent1"/>
+          </a:effectRef>
+          <a:fontRef idx="minor">
+            <a:schemeClr val="lt1"/>
+          </a:fontRef>
+        </p:style>
+        <p:txBody>
+          <a:bodyPr rtlCol="0" anchor="ctr"/>
+          <a:lstStyle/>
+          <a:p>
+            <a:pPr algn="ctr"/>
+            <a:endParaRPr lang="en-US"/>
+          </a:p>
+        </p:txBody>
+      </p:sp>
+      <p:sp>
+        <p:nvSpPr>
+          <p:cNvPr id="4" name="Rectangle 3"/>
+          <p:cNvSpPr/>
+          <p:nvPr/>
+        </p:nvSpPr>
+        <p:spPr>
+          <a:xfrm>
+            <a:off x="4477819" y="1366127"/>
+            <a:ext cx="2657009" cy="769441"/>
+          </a:xfrm>
+          <a:prstGeom prst="rect">
+            <a:avLst/>
+          </a:prstGeom>
+          <a:noFill/>
+        </p:spPr>
+        <p:txBody>
+          <a:bodyPr wrap="none" lIns="91440" tIns="45720" rIns="91440" bIns="45720">
+            <a:spAutoFit/>
+          </a:bodyPr>
+          <a:lstStyle/>
+          <a:p>
+            <a:pPr algn="ctr"/>
+            <a:r>
+              <a:rPr lang="en-US" sz="4400" b="1" dirty="0" smtClean="0">
+                <a:ln w="0"/>
+                <a:solidFill>
+                  <a:srgbClr val="FF0000"/>
+                </a:solidFill>
+                <a:effectLst>
+                  <a:outerShdw blurRad="38100" dist="19050" dir="2700000" algn="tl" rotWithShape="0">
+                    <a:schemeClr val="dk1">
+                      <a:alpha val="40000"/>
+                    </a:schemeClr>
+                  </a:outerShdw>
+                </a:effectLst>
+              </a:rPr>
+              <a:t>High Score</a:t>
+            </a:r>
+            <a:endParaRPr lang="en-US" sz="4400" b="1" cap="none" spc="0" dirty="0">
+              <a:ln w="0"/>
+              <a:solidFill>
+                <a:srgbClr val="FF0000"/>
+              </a:solidFill>
+              <a:effectLst>
+                <a:outerShdw blurRad="38100" dist="19050" dir="2700000" algn="tl" rotWithShape="0">
+                  <a:schemeClr val="dk1">
+                    <a:alpha val="40000"/>
+                  </a:schemeClr>
+                </a:outerShdw>
+              </a:effectLst>
+            </a:endParaRPr>
+          </a:p>
+        </p:txBody>
+      </p:sp>
+      <p:pic>
+        <p:nvPicPr>
+          <p:cNvPr id="3074" name="Picture 2" descr="Image result for happy png"/>
+          <p:cNvPicPr>
+            <a:picLocks noChangeAspect="1" noChangeArrowheads="1"/>
+          </p:cNvPicPr>
+          <p:nvPr/>
+        </p:nvPicPr>
+        <p:blipFill>
+          <a:blip r:embed="rId2" cstate="print">
+            <a:extLst>
+              <a:ext uri="{28A0092B-C50C-407E-A947-70E740481C1C}">
+                <a14:useLocalDpi xmlns:a14="http://schemas.microsoft.com/office/drawing/2010/main" val="0"/>
+              </a:ext>
+            </a:extLst>
+          </a:blip>
+          <a:srcRect/>
+          <a:stretch>
+            <a:fillRect/>
+          </a:stretch>
+        </p:blipFill>
+        <p:spPr bwMode="auto">
+          <a:xfrm>
+            <a:off x="8368549" y="4730470"/>
+            <a:ext cx="1240964" cy="1337820"/>
+          </a:xfrm>
+          <a:prstGeom prst="rect">
+            <a:avLst/>
+          </a:prstGeom>
+          <a:noFill/>
+          <a:extLst>
+            <a:ext uri="{909E8E84-426E-40DD-AFC4-6F175D3DCCD1}">
+              <a14:hiddenFill xmlns:a14="http://schemas.microsoft.com/office/drawing/2010/main">
+                <a:solidFill>
+                  <a:srgbClr val="FFFFFF"/>
+                </a:solidFill>
+              </a14:hiddenFill>
+            </a:ext>
+          </a:extLst>
+        </p:spPr>
+      </p:pic>
+    </p:spTree>
+    <p:extLst>
+      <p:ext uri="{BB962C8B-B14F-4D97-AF65-F5344CB8AC3E}">
+        <p14:creationId xmlns:p14="http://schemas.microsoft.com/office/powerpoint/2010/main" val="1257060797"/>
+      </p:ext>
+    </p:extLst>
+  </p:cSld>
+  <p:clrMapOvr>
+    <a:masterClrMapping/>
+  </p:clrMapOvr>
 </p:sld>
 </file>
 

</xml_diff>